<commit_message>
Corrects solution space scope and constraints
</commit_message>
<xml_diff>
--- a/Project 1 - Monalco Mining/Monalco Mining - Problem Identification.pptx
+++ b/Project 1 - Monalco Mining/Monalco Mining - Problem Identification.pptx
@@ -257,7 +257,7 @@
       </p15:sldGuideLst>
     </p:ext>
     <p:ext uri="http://customooxmlschemas.google.com/">
-      <go:slidesCustomData xmlns:go="http://customooxmlschemas.google.com/" xmlns:p15="http://schemas.microsoft.com/office/powerpoint/2012/main" xmlns:p14="http://schemas.microsoft.com/office/powerpoint/2010/main" xmlns:com="http://schemas.openxmlformats.org/drawingml/2006/compatibility" xmlns:pvml="urn:schemas-microsoft-com:office:powerpoint" xmlns:v="urn:schemas-microsoft-com:vml" xmlns:o="urn:schemas-microsoft-com:office:office" xmlns:dgm="http://schemas.openxmlformats.org/drawingml/2006/diagram" xmlns:c="http://schemas.openxmlformats.org/drawingml/2006/chart" xmlns:mv="urn:schemas-microsoft-com:mac:vml" xmlns:mc="http://schemas.openxmlformats.org/markup-compatibility/2006" xmlns="" r:id="rId7" roundtripDataSignature="AMtx7mjdo7FECp685JsX7/4pIVeoAktjNA=="/>
+      <go:slidesCustomData xmlns="" xmlns:mc="http://schemas.openxmlformats.org/markup-compatibility/2006" xmlns:mv="urn:schemas-microsoft-com:mac:vml" xmlns:c="http://schemas.openxmlformats.org/drawingml/2006/chart" xmlns:dgm="http://schemas.openxmlformats.org/drawingml/2006/diagram" xmlns:o="urn:schemas-microsoft-com:office:office" xmlns:v="urn:schemas-microsoft-com:vml" xmlns:pvml="urn:schemas-microsoft-com:office:powerpoint" xmlns:com="http://schemas.openxmlformats.org/drawingml/2006/compatibility" xmlns:p14="http://schemas.microsoft.com/office/powerpoint/2010/main" xmlns:p15="http://schemas.microsoft.com/office/powerpoint/2012/main" xmlns:go="http://customooxmlschemas.google.com/" r:id="rId7" roundtripDataSignature="AMtx7mjdo7FECp685JsX7/4pIVeoAktjNA=="/>
     </p:ext>
   </p:extLst>
 </p:presentation>
@@ -4162,7 +4162,7 @@
         </p:nvSpPr>
         <p:spPr>
           <a:xfrm>
-            <a:off x="4668375" y="2690913"/>
+            <a:off x="4668375" y="2940293"/>
             <a:ext cx="288315" cy="288315"/>
           </a:xfrm>
           <a:prstGeom prst="rect">
@@ -4230,7 +4230,7 @@
         </p:nvSpPr>
         <p:spPr>
           <a:xfrm>
-            <a:off x="218936" y="3477555"/>
+            <a:off x="218936" y="3560680"/>
             <a:ext cx="288315" cy="288315"/>
           </a:xfrm>
           <a:prstGeom prst="rect">
@@ -4298,7 +4298,7 @@
         </p:nvSpPr>
         <p:spPr>
           <a:xfrm>
-            <a:off x="601195" y="3509611"/>
+            <a:off x="601195" y="3592736"/>
             <a:ext cx="3597454" cy="224203"/>
           </a:xfrm>
           <a:prstGeom prst="rect">
@@ -4364,7 +4364,7 @@
         </p:nvSpPr>
         <p:spPr>
           <a:xfrm>
-            <a:off x="5050634" y="2722969"/>
+            <a:off x="5050634" y="2972349"/>
             <a:ext cx="3597454" cy="224203"/>
           </a:xfrm>
           <a:prstGeom prst="rect">
@@ -4430,7 +4430,7 @@
         </p:nvSpPr>
         <p:spPr>
           <a:xfrm>
-            <a:off x="218936" y="5480272"/>
+            <a:off x="218936" y="5658397"/>
             <a:ext cx="288315" cy="288315"/>
           </a:xfrm>
           <a:prstGeom prst="rect">
@@ -4566,7 +4566,7 @@
         </p:nvSpPr>
         <p:spPr>
           <a:xfrm>
-            <a:off x="601195" y="5514559"/>
+            <a:off x="601195" y="5692684"/>
             <a:ext cx="3597454" cy="219740"/>
           </a:xfrm>
           <a:prstGeom prst="rect">
@@ -4771,7 +4771,7 @@
         </p:nvSpPr>
         <p:spPr>
           <a:xfrm>
-            <a:off x="143108" y="3809333"/>
+            <a:off x="143108" y="3892458"/>
             <a:ext cx="4324418" cy="1410643"/>
           </a:xfrm>
           <a:prstGeom prst="rect">
@@ -4841,8 +4841,8 @@
         </p:nvSpPr>
         <p:spPr>
           <a:xfrm>
-            <a:off x="186842" y="5867392"/>
-            <a:ext cx="1873778" cy="751488"/>
+            <a:off x="186841" y="6045517"/>
+            <a:ext cx="4011807" cy="449707"/>
           </a:xfrm>
           <a:prstGeom prst="rect">
             <a:avLst/>
@@ -4880,22 +4880,12 @@
                 <a:cs typeface="Arial"/>
                 <a:sym typeface="Arial"/>
               </a:rPr>
-              <a:t>Our focus will be threefold. </a:t>
-            </a:r>
-          </a:p>
-          <a:p>
-            <a:pPr marL="0" marR="0" lvl="0" indent="0" algn="l" rtl="0">
-              <a:lnSpc>
-                <a:spcPct val="100000"/>
-              </a:lnSpc>
-              <a:spcBef>
-                <a:spcPts val="0"/>
-              </a:spcBef>
-              <a:spcAft>
-                <a:spcPts val="0"/>
-              </a:spcAft>
-              <a:buNone/>
-            </a:pPr>
+              <a:t>Our focus will be </a:t>
+            </a:r>
+            <a:r>
+              <a:rPr lang="en-AU" sz="1071" dirty="0"/>
+              <a:t>on the </a:t>
+            </a:r>
             <a:r>
               <a:rPr lang="en-AU" sz="1071" i="0" u="none" strike="noStrike" cap="none" dirty="0">
                 <a:solidFill>
@@ -4906,43 +4896,11 @@
                 <a:cs typeface="Arial"/>
                 <a:sym typeface="Arial"/>
               </a:rPr>
-              <a:t>1. Ore crushers</a:t>
-            </a:r>
-          </a:p>
-          <a:p>
-            <a:pPr marL="0" marR="0" lvl="0" indent="0" algn="l" rtl="0">
-              <a:lnSpc>
-                <a:spcPct val="100000"/>
-              </a:lnSpc>
-              <a:spcBef>
-                <a:spcPts val="0"/>
-              </a:spcBef>
-              <a:spcAft>
-                <a:spcPts val="0"/>
-              </a:spcAft>
-              <a:buNone/>
-            </a:pPr>
+              <a:t>ore crushers, their </a:t>
+            </a:r>
             <a:r>
               <a:rPr lang="en-AU" sz="1071" dirty="0"/>
-              <a:t>2. Excess wear</a:t>
-            </a:r>
-          </a:p>
-          <a:p>
-            <a:pPr marL="0" marR="0" lvl="0" indent="0" algn="l" rtl="0">
-              <a:lnSpc>
-                <a:spcPct val="100000"/>
-              </a:lnSpc>
-              <a:spcBef>
-                <a:spcPts val="0"/>
-              </a:spcBef>
-              <a:spcAft>
-                <a:spcPts val="0"/>
-              </a:spcAft>
-              <a:buNone/>
-            </a:pPr>
-            <a:r>
-              <a:rPr lang="en-AU" sz="1071" dirty="0"/>
-              <a:t>3. Annual costs</a:t>
+              <a:t>excess wear and the effect that this has in the annual costs</a:t>
             </a:r>
           </a:p>
           <a:p>
@@ -5004,6 +4962,12 @@
             <a:r>
               <a:rPr lang="en-US" sz="1100" dirty="0"/>
               <a:t>Reliability of Data: two sources of information for maintenance work exist (Ellipse and SAP). </a:t>
+            </a:r>
+          </a:p>
+          <a:p>
+            <a:r>
+              <a:rPr lang="en-US" sz="1100" dirty="0"/>
+              <a:t>The ore crushers have to have at least 1 maintenance for every 50.000 tones of iron processed</a:t>
             </a:r>
             <a:endParaRPr lang="en-US" sz="1070" dirty="0"/>
           </a:p>
@@ -5245,8 +5209,8 @@
         </p:nvSpPr>
         <p:spPr>
           <a:xfrm>
-            <a:off x="4607126" y="3031417"/>
-            <a:ext cx="4324418" cy="1456647"/>
+            <a:off x="4607126" y="3280798"/>
+            <a:ext cx="4324418" cy="1081066"/>
           </a:xfrm>
           <a:prstGeom prst="rect">
             <a:avLst/>
@@ -5310,33 +5274,6 @@
               <a:rPr lang="en-US" sz="1100" dirty="0"/>
               <a:t>Tara Starr - Maintenance SME</a:t>
             </a:r>
-          </a:p>
-          <a:p>
-            <a:pPr lvl="0"/>
-            <a:r>
-              <a:rPr lang="en-US" sz="1100" dirty="0"/>
-              <a:t>Note: keep Insights &amp; Analytics Team in the loop (Chris </a:t>
-            </a:r>
-            <a:r>
-              <a:rPr lang="en-US" sz="1100"/>
-              <a:t>Hui lead</a:t>
-            </a:r>
-            <a:r>
-              <a:rPr lang="en-US" sz="1100" dirty="0"/>
-              <a:t>)</a:t>
-            </a:r>
-          </a:p>
-          <a:p>
-            <a:pPr lvl="0"/>
-            <a:endParaRPr sz="1400" i="0" u="none" strike="noStrike" cap="none" dirty="0">
-              <a:solidFill>
-                <a:srgbClr val="000000"/>
-              </a:solidFill>
-              <a:latin typeface="Arial"/>
-              <a:ea typeface="Arial"/>
-              <a:cs typeface="Arial"/>
-              <a:sym typeface="Arial"/>
-            </a:endParaRPr>
           </a:p>
         </p:txBody>
       </p:sp>
@@ -5373,144 +5310,6 @@
               <a:t>How can we scale back the annual maintenance costs of ore crushers in at least 20% to reach a budget buffer during 2019 to account for possible iron ore price drops in the market?</a:t>
             </a:r>
             <a:endParaRPr lang="en-US" sz="1400" i="0" u="none" strike="noStrike" cap="none" dirty="0">
-              <a:solidFill>
-                <a:srgbClr val="000000"/>
-              </a:solidFill>
-              <a:latin typeface="Arial"/>
-              <a:ea typeface="Arial"/>
-              <a:cs typeface="Arial"/>
-              <a:sym typeface="Arial"/>
-            </a:endParaRPr>
-          </a:p>
-        </p:txBody>
-      </p:sp>
-      <p:sp>
-        <p:nvSpPr>
-          <p:cNvPr id="49" name="Google Shape;36;p1">
-            <a:extLst>
-              <a:ext uri="{FF2B5EF4-FFF2-40B4-BE49-F238E27FC236}">
-                <a16:creationId xmlns:a16="http://schemas.microsoft.com/office/drawing/2014/main" id="{0D391A4E-E71B-2F43-B8F2-A28B9323DABD}"/>
-              </a:ext>
-            </a:extLst>
-          </p:cNvPr>
-          <p:cNvSpPr txBox="1"/>
-          <p:nvPr/>
-        </p:nvSpPr>
-        <p:spPr>
-          <a:xfrm>
-            <a:off x="2089775" y="5867392"/>
-            <a:ext cx="2237526" cy="751488"/>
-          </a:xfrm>
-          <a:prstGeom prst="rect">
-            <a:avLst/>
-          </a:prstGeom>
-          <a:noFill/>
-          <a:ln>
-            <a:noFill/>
-          </a:ln>
-        </p:spPr>
-        <p:txBody>
-          <a:bodyPr spcFirstLastPara="1" wrap="square" lIns="91425" tIns="45700" rIns="91425" bIns="45700" anchor="t" anchorCtr="0">
-            <a:noAutofit/>
-          </a:bodyPr>
-          <a:lstStyle/>
-          <a:p>
-            <a:pPr marL="0" marR="0" lvl="0" indent="0" algn="l" rtl="0">
-              <a:lnSpc>
-                <a:spcPct val="100000"/>
-              </a:lnSpc>
-              <a:spcBef>
-                <a:spcPts val="0"/>
-              </a:spcBef>
-              <a:spcAft>
-                <a:spcPts val="0"/>
-              </a:spcAft>
-              <a:buNone/>
-            </a:pPr>
-            <a:r>
-              <a:rPr lang="en-AU" sz="1071" i="0" u="none" strike="noStrike" cap="none" dirty="0">
-                <a:solidFill>
-                  <a:srgbClr val="000000"/>
-                </a:solidFill>
-                <a:latin typeface="Arial"/>
-                <a:ea typeface="Arial"/>
-                <a:cs typeface="Arial"/>
-                <a:sym typeface="Arial"/>
-              </a:rPr>
-              <a:t>Focus </a:t>
-            </a:r>
-            <a:r>
-              <a:rPr lang="en-AU" sz="1071" dirty="0"/>
-              <a:t>will not be on:</a:t>
-            </a:r>
-            <a:endParaRPr lang="en-AU" sz="1071" i="0" u="none" strike="noStrike" cap="none" dirty="0">
-              <a:solidFill>
-                <a:srgbClr val="000000"/>
-              </a:solidFill>
-              <a:latin typeface="Arial"/>
-              <a:ea typeface="Arial"/>
-              <a:cs typeface="Arial"/>
-              <a:sym typeface="Arial"/>
-            </a:endParaRPr>
-          </a:p>
-          <a:p>
-            <a:pPr marL="0" marR="0" lvl="0" indent="0" algn="l" rtl="0">
-              <a:lnSpc>
-                <a:spcPct val="100000"/>
-              </a:lnSpc>
-              <a:spcBef>
-                <a:spcPts val="0"/>
-              </a:spcBef>
-              <a:spcAft>
-                <a:spcPts val="0"/>
-              </a:spcAft>
-              <a:buNone/>
-            </a:pPr>
-            <a:r>
-              <a:rPr lang="en-AU" sz="1071" i="0" u="none" strike="noStrike" cap="none" dirty="0">
-                <a:solidFill>
-                  <a:srgbClr val="000000"/>
-                </a:solidFill>
-                <a:latin typeface="Arial"/>
-                <a:ea typeface="Arial"/>
-                <a:cs typeface="Arial"/>
-                <a:sym typeface="Arial"/>
-              </a:rPr>
-              <a:t>1. Other machines</a:t>
-            </a:r>
-          </a:p>
-          <a:p>
-            <a:pPr marL="0" marR="0" lvl="0" indent="0" algn="l" rtl="0">
-              <a:lnSpc>
-                <a:spcPct val="100000"/>
-              </a:lnSpc>
-              <a:spcBef>
-                <a:spcPts val="0"/>
-              </a:spcBef>
-              <a:spcAft>
-                <a:spcPts val="0"/>
-              </a:spcAft>
-              <a:buNone/>
-            </a:pPr>
-            <a:r>
-              <a:rPr lang="en-AU" sz="1071" dirty="0"/>
-              <a:t>2. Revenues &amp; Market Demand</a:t>
-            </a:r>
-          </a:p>
-          <a:p>
-            <a:pPr marL="0" marR="0" lvl="0" indent="0" algn="l" rtl="0">
-              <a:lnSpc>
-                <a:spcPct val="100000"/>
-              </a:lnSpc>
-              <a:spcBef>
-                <a:spcPts val="0"/>
-              </a:spcBef>
-              <a:spcAft>
-                <a:spcPts val="0"/>
-              </a:spcAft>
-              <a:buNone/>
-            </a:pPr>
-            <a:endParaRPr sz="1400" b="0" i="0" u="none" strike="noStrike" cap="none" dirty="0">
               <a:solidFill>
                 <a:srgbClr val="000000"/>
               </a:solidFill>

</xml_diff>